<commit_message>
Phase A - v1.3
</commit_message>
<xml_diff>
--- a/Capstone Project Phase A/‏‏Spotting Suspicious Academic Citations Using Self-Learning Graph Transformers .pptx
+++ b/Capstone Project Phase A/‏‏Spotting Suspicious Academic Citations Using Self-Learning Graph Transformers .pptx
@@ -936,7 +936,138 @@
               </a:spcAft>
               <a:buNone/>
             </a:pPr>
-            <a:endParaRPr/>
+            <a:endParaRPr lang="en-US" b="1" u="sng" dirty="0"/>
+          </a:p>
+          <a:p>
+            <a:pPr marL="0" lvl="0" indent="0" algn="l" rtl="0">
+              <a:spcBef>
+                <a:spcPts val="0"/>
+              </a:spcBef>
+              <a:spcAft>
+                <a:spcPts val="0"/>
+              </a:spcAft>
+              <a:buNone/>
+            </a:pPr>
+            <a:r>
+              <a:rPr lang="en-US" b="1" u="sng"/>
+              <a:t>If panel, </a:t>
+            </a:r>
+            <a:r>
+              <a:rPr lang="en-US" b="1" u="sng" dirty="0"/>
+              <a:t>ask </a:t>
+            </a:r>
+            <a:r>
+              <a:rPr lang="en-US" b="1" u="sng"/>
+              <a:t>about hyper-pram:</a:t>
+            </a:r>
+          </a:p>
+          <a:p>
+            <a:pPr marL="0" lvl="0" indent="0" algn="l" rtl="0">
+              <a:spcBef>
+                <a:spcPts val="0"/>
+              </a:spcBef>
+              <a:spcAft>
+                <a:spcPts val="0"/>
+              </a:spcAft>
+              <a:buNone/>
+            </a:pPr>
+            <a:r>
+              <a:rPr lang="en-US" b="1" u="sng" dirty="0"/>
+              <a:t>Cora:</a:t>
+            </a:r>
+          </a:p>
+          <a:p>
+            <a:pPr marL="0" lvl="0" indent="0" algn="l" rtl="0">
+              <a:spcBef>
+                <a:spcPts val="0"/>
+              </a:spcBef>
+              <a:spcAft>
+                <a:spcPts val="0"/>
+              </a:spcAft>
+              <a:buNone/>
+            </a:pPr>
+            <a:r>
+              <a:rPr lang="en-US" dirty="0"/>
+              <a:t>Batch size == 32 ,  Mask Ratio == 0.8 , </a:t>
+            </a:r>
+            <a:r>
+              <a:rPr lang="en-US" dirty="0" err="1"/>
+              <a:t>n_encoder_layers</a:t>
+            </a:r>
+            <a:r>
+              <a:rPr lang="en-US" dirty="0"/>
+              <a:t> == 4 , </a:t>
+            </a:r>
+            <a:r>
+              <a:rPr lang="en-US" dirty="0" err="1"/>
+              <a:t>n_decoder_layers</a:t>
+            </a:r>
+            <a:r>
+              <a:rPr lang="en-US" dirty="0"/>
+              <a:t> == 2 .</a:t>
+            </a:r>
+          </a:p>
+          <a:p>
+            <a:pPr marL="0" lvl="0" indent="0" algn="l" rtl="0">
+              <a:spcBef>
+                <a:spcPts val="0"/>
+              </a:spcBef>
+              <a:spcAft>
+                <a:spcPts val="0"/>
+              </a:spcAft>
+              <a:buNone/>
+            </a:pPr>
+            <a:r>
+              <a:rPr lang="en-US" b="1" u="sng" dirty="0" err="1"/>
+              <a:t>Citeseer</a:t>
+            </a:r>
+            <a:r>
+              <a:rPr lang="en-US" b="1" u="sng" dirty="0"/>
+              <a:t>:</a:t>
+            </a:r>
+          </a:p>
+          <a:p>
+            <a:pPr marL="0" lvl="0" indent="0" algn="l" rtl="0">
+              <a:spcBef>
+                <a:spcPts val="0"/>
+              </a:spcBef>
+              <a:spcAft>
+                <a:spcPts val="0"/>
+              </a:spcAft>
+              <a:buNone/>
+            </a:pPr>
+            <a:r>
+              <a:rPr lang="en-US" dirty="0"/>
+              <a:t>Batch size == 64 ,  Mask Ratio == 0.7 , </a:t>
+            </a:r>
+            <a:r>
+              <a:rPr lang="en-US" dirty="0" err="1"/>
+              <a:t>n_encoder_layers</a:t>
+            </a:r>
+            <a:r>
+              <a:rPr lang="en-US" dirty="0"/>
+              <a:t> == 8 , </a:t>
+            </a:r>
+            <a:r>
+              <a:rPr lang="en-US" dirty="0" err="1"/>
+              <a:t>n_decoder_layers</a:t>
+            </a:r>
+            <a:r>
+              <a:rPr lang="en-US" dirty="0"/>
+              <a:t> == 2 .</a:t>
+            </a:r>
+          </a:p>
+          <a:p>
+            <a:pPr marL="0" lvl="0" indent="0" algn="l" rtl="0">
+              <a:spcBef>
+                <a:spcPts val="0"/>
+              </a:spcBef>
+              <a:spcAft>
+                <a:spcPts val="0"/>
+              </a:spcAft>
+              <a:buNone/>
+            </a:pPr>
+            <a:endParaRPr dirty="0"/>
           </a:p>
         </p:txBody>
       </p:sp>
@@ -2395,6 +2526,82 @@
           </a:bodyPr>
           <a:lstStyle/>
           <a:p>
+            <a:pPr marL="285750" indent="-285750">
+              <a:buFont typeface="Wingdings" panose="05000000000000000000" pitchFamily="2" charset="2"/>
+              <a:buChar char="Ø"/>
+            </a:pPr>
+            <a:r>
+              <a:rPr lang="en-US" sz="1100" dirty="0">
+                <a:solidFill>
+                  <a:srgbClr val="002060"/>
+                </a:solidFill>
+              </a:rPr>
+              <a:t>Positional encoding is similarly essential in graph mining, where the order of nodes and edges in a graph can give important information about the relationships between entities.</a:t>
+            </a:r>
+          </a:p>
+          <a:p>
+            <a:pPr marL="0" indent="0">
+              <a:buFont typeface="Wingdings" panose="05000000000000000000" pitchFamily="2" charset="2"/>
+              <a:buNone/>
+            </a:pPr>
+            <a:r>
+              <a:rPr lang="en-US" sz="1100" dirty="0">
+                <a:solidFill>
+                  <a:srgbClr val="002060"/>
+                </a:solidFill>
+              </a:rPr>
+              <a:t> </a:t>
+            </a:r>
+          </a:p>
+          <a:p>
+            <a:pPr marL="285750" indent="-285750">
+              <a:buFont typeface="Wingdings" panose="05000000000000000000" pitchFamily="2" charset="2"/>
+              <a:buChar char="Ø"/>
+            </a:pPr>
+            <a:r>
+              <a:rPr lang="en-US" sz="1100" dirty="0">
+                <a:solidFill>
+                  <a:srgbClr val="002060"/>
+                </a:solidFill>
+              </a:rPr>
+              <a:t>(</a:t>
+            </a:r>
+            <a:r>
+              <a:rPr lang="en-US" b="0" i="0" dirty="0">
+                <a:effectLst/>
+                <a:highlight>
+                  <a:srgbClr val="F3F3F3"/>
+                </a:highlight>
+                <a:latin typeface="SegoeUIVariable"/>
+              </a:rPr>
+              <a:t>“Positional encoding is important in graph mining too. The sequence of nodes and edges in a graph can give us useful information about how different things are connected.”</a:t>
+            </a:r>
+            <a:r>
+              <a:rPr lang="en-US" sz="1100" b="0" i="0" dirty="0">
+                <a:solidFill>
+                  <a:srgbClr val="002060"/>
+                </a:solidFill>
+                <a:effectLst/>
+                <a:highlight>
+                  <a:srgbClr val="F3F3F3"/>
+                </a:highlight>
+                <a:latin typeface="SegoeUIVariable"/>
+              </a:rPr>
+              <a:t>)</a:t>
+            </a:r>
+          </a:p>
+          <a:p>
+            <a:pPr marL="285750" indent="-285750">
+              <a:buFont typeface="Wingdings" panose="05000000000000000000" pitchFamily="2" charset="2"/>
+              <a:buChar char="Ø"/>
+            </a:pPr>
+            <a:endParaRPr lang="en-US" sz="1100" dirty="0">
+              <a:solidFill>
+                <a:srgbClr val="002060"/>
+              </a:solidFill>
+            </a:endParaRPr>
+          </a:p>
+          <a:p>
             <a:pPr marL="0" lvl="0" indent="0" algn="l" rtl="0">
               <a:spcBef>
                 <a:spcPts val="0"/>
@@ -2404,7 +2611,7 @@
               </a:spcAft>
               <a:buNone/>
             </a:pPr>
-            <a:endParaRPr/>
+            <a:endParaRPr dirty="0"/>
           </a:p>
         </p:txBody>
       </p:sp>
@@ -2499,6 +2706,230 @@
           </a:bodyPr>
           <a:lstStyle/>
           <a:p>
+            <a:pPr marL="0" marR="0" lvl="0" indent="0" algn="l" defTabSz="914400" rtl="0" eaLnBrk="1" fontAlgn="auto" latinLnBrk="0" hangingPunct="1">
+              <a:lnSpc>
+                <a:spcPct val="100000"/>
+              </a:lnSpc>
+              <a:spcBef>
+                <a:spcPts val="0"/>
+              </a:spcBef>
+              <a:spcAft>
+                <a:spcPts val="0"/>
+              </a:spcAft>
+              <a:buClr>
+                <a:srgbClr val="000000"/>
+              </a:buClr>
+              <a:buSzPts val="1100"/>
+              <a:buFont typeface="Wingdings" panose="05000000000000000000" pitchFamily="2" charset="2"/>
+              <a:buNone/>
+              <a:tabLst/>
+              <a:defRPr/>
+            </a:pPr>
+            <a:r>
+              <a:rPr lang="en-US" dirty="0"/>
+              <a:t>(principle)</a:t>
+            </a:r>
+          </a:p>
+          <a:p>
+            <a:pPr marL="0" marR="0" lvl="0" indent="0" algn="l" defTabSz="914400" rtl="0" eaLnBrk="1" fontAlgn="auto" latinLnBrk="0" hangingPunct="1">
+              <a:lnSpc>
+                <a:spcPct val="100000"/>
+              </a:lnSpc>
+              <a:spcBef>
+                <a:spcPts val="0"/>
+              </a:spcBef>
+              <a:spcAft>
+                <a:spcPts val="0"/>
+              </a:spcAft>
+              <a:buClr>
+                <a:srgbClr val="000000"/>
+              </a:buClr>
+              <a:buSzPts val="1100"/>
+              <a:buFont typeface="Wingdings" panose="05000000000000000000" pitchFamily="2" charset="2"/>
+              <a:buNone/>
+              <a:tabLst/>
+              <a:defRPr/>
+            </a:pPr>
+            <a:endParaRPr lang="en-US" sz="1100" dirty="0">
+              <a:solidFill>
+                <a:srgbClr val="002060"/>
+              </a:solidFill>
+            </a:endParaRPr>
+          </a:p>
+          <a:p>
+            <a:pPr marL="285750" marR="0" lvl="0" indent="-285750" algn="l" defTabSz="914400" rtl="0" eaLnBrk="1" fontAlgn="auto" latinLnBrk="0" hangingPunct="1">
+              <a:lnSpc>
+                <a:spcPct val="100000"/>
+              </a:lnSpc>
+              <a:spcBef>
+                <a:spcPts val="0"/>
+              </a:spcBef>
+              <a:spcAft>
+                <a:spcPts val="0"/>
+              </a:spcAft>
+              <a:buClr>
+                <a:srgbClr val="000000"/>
+              </a:buClr>
+              <a:buSzPts val="1100"/>
+              <a:buFont typeface="Wingdings" panose="05000000000000000000" pitchFamily="2" charset="2"/>
+              <a:buChar char="Ø"/>
+              <a:tabLst/>
+              <a:defRPr/>
+            </a:pPr>
+            <a:endParaRPr lang="en-US" sz="1100" dirty="0">
+              <a:solidFill>
+                <a:srgbClr val="002060"/>
+              </a:solidFill>
+            </a:endParaRPr>
+          </a:p>
+          <a:p>
+            <a:pPr marL="285750" marR="0" lvl="0" indent="-285750" algn="l" defTabSz="914400" rtl="0" eaLnBrk="1" fontAlgn="auto" latinLnBrk="0" hangingPunct="1">
+              <a:lnSpc>
+                <a:spcPct val="100000"/>
+              </a:lnSpc>
+              <a:spcBef>
+                <a:spcPts val="0"/>
+              </a:spcBef>
+              <a:spcAft>
+                <a:spcPts val="0"/>
+              </a:spcAft>
+              <a:buClr>
+                <a:srgbClr val="000000"/>
+              </a:buClr>
+              <a:buSzPts val="1100"/>
+              <a:buFont typeface="Wingdings" panose="05000000000000000000" pitchFamily="2" charset="2"/>
+              <a:buChar char="Ø"/>
+              <a:tabLst/>
+              <a:defRPr/>
+            </a:pPr>
+            <a:r>
+              <a:rPr lang="en-US" sz="1100" dirty="0" err="1">
+                <a:solidFill>
+                  <a:srgbClr val="002060"/>
+                </a:solidFill>
+              </a:rPr>
+              <a:t>Graphormer</a:t>
+            </a:r>
+            <a:r>
+              <a:rPr lang="en-US" sz="1100" dirty="0">
+                <a:solidFill>
+                  <a:srgbClr val="002060"/>
+                </a:solidFill>
+              </a:rPr>
+              <a:t>, a powerful graph representation learning model, leverages positional encoding to capture the structural information of graphs effectively</a:t>
+            </a:r>
+            <a:r>
+              <a:rPr lang="en-US" sz="1050" dirty="0">
+                <a:solidFill>
+                  <a:srgbClr val="002060"/>
+                </a:solidFill>
+              </a:rPr>
+              <a:t>.</a:t>
+            </a:r>
+            <a:endParaRPr lang="en-US" dirty="0">
+              <a:solidFill>
+                <a:srgbClr val="FFFF00"/>
+              </a:solidFill>
+              <a:latin typeface="Inter Tight" pitchFamily="2" charset="0"/>
+              <a:ea typeface="Inter Tight" pitchFamily="2" charset="0"/>
+              <a:cs typeface="Inter Tight" pitchFamily="2" charset="0"/>
+            </a:endParaRPr>
+          </a:p>
+          <a:p>
+            <a:pPr marL="285750" marR="0" lvl="0" indent="-285750" algn="l" defTabSz="914400" rtl="0" eaLnBrk="1" fontAlgn="auto" latinLnBrk="0" hangingPunct="1">
+              <a:lnSpc>
+                <a:spcPct val="100000"/>
+              </a:lnSpc>
+              <a:spcBef>
+                <a:spcPts val="0"/>
+              </a:spcBef>
+              <a:spcAft>
+                <a:spcPts val="0"/>
+              </a:spcAft>
+              <a:buClr>
+                <a:srgbClr val="000000"/>
+              </a:buClr>
+              <a:buSzPts val="1100"/>
+              <a:buFont typeface="Wingdings" panose="05000000000000000000" pitchFamily="2" charset="2"/>
+              <a:buChar char="Ø"/>
+              <a:tabLst/>
+              <a:defRPr/>
+            </a:pPr>
+            <a:endParaRPr lang="en-US" sz="1100" dirty="0">
+              <a:solidFill>
+                <a:srgbClr val="002060"/>
+              </a:solidFill>
+            </a:endParaRPr>
+          </a:p>
+          <a:p>
+            <a:pPr marL="285750" marR="0" lvl="0" indent="-285750" algn="l" defTabSz="914400" rtl="0" eaLnBrk="1" fontAlgn="auto" latinLnBrk="0" hangingPunct="1">
+              <a:lnSpc>
+                <a:spcPct val="100000"/>
+              </a:lnSpc>
+              <a:spcBef>
+                <a:spcPts val="0"/>
+              </a:spcBef>
+              <a:spcAft>
+                <a:spcPts val="0"/>
+              </a:spcAft>
+              <a:buClr>
+                <a:srgbClr val="000000"/>
+              </a:buClr>
+              <a:buSzPts val="1100"/>
+              <a:buFont typeface="Wingdings" panose="05000000000000000000" pitchFamily="2" charset="2"/>
+              <a:buChar char="Ø"/>
+              <a:tabLst/>
+              <a:defRPr/>
+            </a:pPr>
+            <a:r>
+              <a:rPr lang="en-US" sz="1100" dirty="0">
+                <a:solidFill>
+                  <a:srgbClr val="002060"/>
+                </a:solidFill>
+              </a:rPr>
+              <a:t>Positional encoding is similarly essential in graph mining, where the order of nodes and edges in a graph can give important information about the relationships between entities.                                                                               (</a:t>
+            </a:r>
+            <a:r>
+              <a:rPr lang="en-US" b="0" i="0" dirty="0">
+                <a:effectLst/>
+                <a:highlight>
+                  <a:srgbClr val="F3F3F3"/>
+                </a:highlight>
+                <a:latin typeface="SegoeUIVariable"/>
+              </a:rPr>
+              <a:t>“Positional encoding is important in graph mining too. The sequence of nodes and edges in a graph can give us useful information about how different things are connected.”</a:t>
+            </a:r>
+            <a:r>
+              <a:rPr lang="en-US" sz="1100" b="0" i="0" dirty="0">
+                <a:solidFill>
+                  <a:srgbClr val="002060"/>
+                </a:solidFill>
+                <a:effectLst/>
+                <a:highlight>
+                  <a:srgbClr val="F3F3F3"/>
+                </a:highlight>
+                <a:latin typeface="SegoeUIVariable"/>
+              </a:rPr>
+              <a:t>)</a:t>
+            </a:r>
+          </a:p>
+          <a:p>
+            <a:pPr marL="0" indent="0">
+              <a:buFont typeface="Wingdings" panose="05000000000000000000" pitchFamily="2" charset="2"/>
+              <a:buNone/>
+            </a:pPr>
+            <a:endParaRPr lang="en-US" sz="1100" b="0" i="0" dirty="0">
+              <a:solidFill>
+                <a:srgbClr val="002060"/>
+              </a:solidFill>
+              <a:effectLst/>
+              <a:highlight>
+                <a:srgbClr val="F3F3F3"/>
+              </a:highlight>
+              <a:latin typeface="SegoeUIVariable"/>
+            </a:endParaRPr>
+          </a:p>
+          <a:p>
             <a:pPr marL="0" lvl="0" indent="0" algn="l" rtl="0">
               <a:spcBef>
                 <a:spcPts val="0"/>
@@ -2508,7 +2939,178 @@
               </a:spcAft>
               <a:buNone/>
             </a:pPr>
-            <a:endParaRPr/>
+            <a:r>
+              <a:rPr lang="en-US" dirty="0">
+                <a:solidFill>
+                  <a:srgbClr val="FFFF00"/>
+                </a:solidFill>
+                <a:latin typeface="Inter Tight" pitchFamily="2" charset="0"/>
+                <a:ea typeface="Inter Tight" pitchFamily="2" charset="0"/>
+                <a:cs typeface="Inter Tight" pitchFamily="2" charset="0"/>
+              </a:rPr>
+              <a:t>centrality encoding == </a:t>
+            </a:r>
+            <a:r>
+              <a:rPr lang="en-US" dirty="0">
+                <a:solidFill>
+                  <a:schemeClr val="tx1"/>
+                </a:solidFill>
+                <a:latin typeface="Inter Tight" pitchFamily="2" charset="0"/>
+                <a:ea typeface="Inter Tight" pitchFamily="2" charset="0"/>
+                <a:cs typeface="Inter Tight" pitchFamily="2" charset="0"/>
+              </a:rPr>
+              <a:t>degree centralities .</a:t>
+            </a:r>
+          </a:p>
+          <a:p>
+            <a:pPr marL="0" lvl="0" indent="0" algn="l" rtl="0">
+              <a:spcBef>
+                <a:spcPts val="0"/>
+              </a:spcBef>
+              <a:spcAft>
+                <a:spcPts val="0"/>
+              </a:spcAft>
+              <a:buNone/>
+            </a:pPr>
+            <a:endParaRPr lang="en-US" dirty="0">
+              <a:solidFill>
+                <a:schemeClr val="tx1"/>
+              </a:solidFill>
+              <a:latin typeface="Inter Tight" pitchFamily="2" charset="0"/>
+              <a:ea typeface="Inter Tight" pitchFamily="2" charset="0"/>
+              <a:cs typeface="Inter Tight" pitchFamily="2" charset="0"/>
+            </a:endParaRPr>
+          </a:p>
+          <a:p>
+            <a:pPr marL="0" lvl="0" indent="0" algn="l" rtl="0">
+              <a:spcBef>
+                <a:spcPts val="0"/>
+              </a:spcBef>
+              <a:spcAft>
+                <a:spcPts val="0"/>
+              </a:spcAft>
+              <a:buNone/>
+            </a:pPr>
+            <a:r>
+              <a:rPr lang="en-US" dirty="0">
+                <a:solidFill>
+                  <a:srgbClr val="FFFF00"/>
+                </a:solidFill>
+                <a:latin typeface="Inter Tight" pitchFamily="2" charset="0"/>
+                <a:ea typeface="Inter Tight" pitchFamily="2" charset="0"/>
+                <a:cs typeface="Inter Tight" pitchFamily="2" charset="0"/>
+              </a:rPr>
+              <a:t>spatial encoding</a:t>
+            </a:r>
+            <a:r>
+              <a:rPr lang="en-US" dirty="0">
+                <a:solidFill>
+                  <a:schemeClr val="tx1"/>
+                </a:solidFill>
+                <a:latin typeface="Inter Tight" pitchFamily="2" charset="0"/>
+                <a:ea typeface="Inter Tight" pitchFamily="2" charset="0"/>
+                <a:cs typeface="Inter Tight" pitchFamily="2" charset="0"/>
+              </a:rPr>
+              <a:t> == shortest path distances (</a:t>
+            </a:r>
+            <a:r>
+              <a:rPr lang="en-US" dirty="0" err="1"/>
+              <a:t>floyd</a:t>
+            </a:r>
+            <a:r>
+              <a:rPr lang="en-US" dirty="0"/>
+              <a:t> </a:t>
+            </a:r>
+            <a:r>
+              <a:rPr lang="en-US" dirty="0" err="1"/>
+              <a:t>warshall</a:t>
+            </a:r>
+            <a:r>
+              <a:rPr lang="en-US" dirty="0"/>
+              <a:t>)</a:t>
+            </a:r>
+            <a:r>
+              <a:rPr lang="en-US" dirty="0">
+                <a:solidFill>
+                  <a:schemeClr val="tx1"/>
+                </a:solidFill>
+                <a:latin typeface="Inter Tight" pitchFamily="2" charset="0"/>
+                <a:ea typeface="Inter Tight" pitchFamily="2" charset="0"/>
+                <a:cs typeface="Inter Tight" pitchFamily="2" charset="0"/>
+              </a:rPr>
+              <a:t>.</a:t>
+            </a:r>
+          </a:p>
+          <a:p>
+            <a:pPr marL="0" lvl="0" indent="0" algn="l" rtl="0">
+              <a:spcBef>
+                <a:spcPts val="0"/>
+              </a:spcBef>
+              <a:spcAft>
+                <a:spcPts val="0"/>
+              </a:spcAft>
+              <a:buNone/>
+            </a:pPr>
+            <a:endParaRPr lang="en-US" dirty="0">
+              <a:solidFill>
+                <a:schemeClr val="tx1"/>
+              </a:solidFill>
+              <a:latin typeface="Inter Tight" pitchFamily="2" charset="0"/>
+              <a:ea typeface="Inter Tight" pitchFamily="2" charset="0"/>
+              <a:cs typeface="Inter Tight" pitchFamily="2" charset="0"/>
+            </a:endParaRPr>
+          </a:p>
+          <a:p>
+            <a:pPr marL="0" lvl="0" indent="0" algn="l" rtl="0">
+              <a:spcBef>
+                <a:spcPts val="0"/>
+              </a:spcBef>
+              <a:spcAft>
+                <a:spcPts val="0"/>
+              </a:spcAft>
+              <a:buNone/>
+            </a:pPr>
+            <a:r>
+              <a:rPr lang="en-US" dirty="0">
+                <a:solidFill>
+                  <a:srgbClr val="FFFF00"/>
+                </a:solidFill>
+                <a:latin typeface="Inter Tight" pitchFamily="2" charset="0"/>
+                <a:ea typeface="Inter Tight" pitchFamily="2" charset="0"/>
+                <a:cs typeface="Inter Tight" pitchFamily="2" charset="0"/>
+              </a:rPr>
+              <a:t>the edge encoding </a:t>
+            </a:r>
+            <a:r>
+              <a:rPr lang="en-US" dirty="0">
+                <a:solidFill>
+                  <a:schemeClr val="tx1"/>
+                </a:solidFill>
+                <a:latin typeface="Inter Tight" pitchFamily="2" charset="0"/>
+                <a:ea typeface="Inter Tight" pitchFamily="2" charset="0"/>
+                <a:cs typeface="Inter Tight" pitchFamily="2" charset="0"/>
+              </a:rPr>
+              <a:t>== the edge features respectively. </a:t>
+            </a:r>
+          </a:p>
+          <a:p>
+            <a:pPr marL="0" lvl="0" indent="0" algn="l" rtl="0">
+              <a:spcBef>
+                <a:spcPts val="0"/>
+              </a:spcBef>
+              <a:spcAft>
+                <a:spcPts val="0"/>
+              </a:spcAft>
+              <a:buNone/>
+            </a:pPr>
+            <a:endParaRPr lang="en-US" dirty="0">
+              <a:solidFill>
+                <a:schemeClr val="tx1"/>
+              </a:solidFill>
+              <a:latin typeface="Inter Tight" pitchFamily="2" charset="0"/>
+              <a:ea typeface="Inter Tight" pitchFamily="2" charset="0"/>
+              <a:cs typeface="Inter Tight" pitchFamily="2" charset="0"/>
+            </a:endParaRPr>
           </a:p>
         </p:txBody>
       </p:sp>
@@ -29409,8 +30011,8 @@
         </p:nvSpPr>
         <p:spPr>
           <a:xfrm>
-            <a:off x="681453" y="1181690"/>
-            <a:ext cx="7459272" cy="3385542"/>
+            <a:off x="605703" y="969275"/>
+            <a:ext cx="7459272" cy="1446550"/>
           </a:xfrm>
           <a:prstGeom prst="rect">
             <a:avLst/>
@@ -29433,7 +30035,7 @@
                   <a:srgbClr val="002060"/>
                 </a:solidFill>
               </a:rPr>
-              <a:t>In AI, positional encoding is a technique that allows neural networks to learn meaningful representations of the order of words in a sentence.</a:t>
+              <a:t>In NLP, positional encoding is a technique that allows neural networks to learn meaningful representations of the order of words in a sentence.</a:t>
             </a:r>
             <a:endParaRPr lang="he-IL" sz="1800" dirty="0">
               <a:solidFill>
@@ -29457,61 +30059,6 @@
               <a:buFont typeface="Wingdings" panose="05000000000000000000" pitchFamily="2" charset="2"/>
               <a:buChar char="Ø"/>
             </a:pPr>
-            <a:r>
-              <a:rPr lang="en-US" sz="1800" dirty="0">
-                <a:solidFill>
-                  <a:srgbClr val="002060"/>
-                </a:solidFill>
-              </a:rPr>
-              <a:t>Positional encoding is similarly essential in graph mining, where the order of nodes and edges in a graph can convey valuable information about the relationships between entities. </a:t>
-            </a:r>
-          </a:p>
-          <a:p>
-            <a:pPr marL="285750" indent="-285750">
-              <a:buFont typeface="Wingdings" panose="05000000000000000000" pitchFamily="2" charset="2"/>
-              <a:buChar char="Ø"/>
-            </a:pPr>
-            <a:endParaRPr lang="en-US" sz="1800" dirty="0">
-              <a:solidFill>
-                <a:srgbClr val="002060"/>
-              </a:solidFill>
-            </a:endParaRPr>
-          </a:p>
-          <a:p>
-            <a:pPr marL="285750" indent="-285750">
-              <a:buFont typeface="Wingdings" panose="05000000000000000000" pitchFamily="2" charset="2"/>
-              <a:buChar char="Ø"/>
-            </a:pPr>
-            <a:r>
-              <a:rPr lang="en-US" sz="1800" dirty="0" err="1">
-                <a:solidFill>
-                  <a:srgbClr val="002060"/>
-                </a:solidFill>
-              </a:rPr>
-              <a:t>Graphormer</a:t>
-            </a:r>
-            <a:r>
-              <a:rPr lang="en-US" sz="1800" dirty="0">
-                <a:solidFill>
-                  <a:srgbClr val="002060"/>
-                </a:solidFill>
-              </a:rPr>
-              <a:t>, a powerful graph representation learning model, leverages positional encoding to capture the structural information of graphs effectively</a:t>
-            </a:r>
-            <a:r>
-              <a:rPr lang="en-US" sz="1600" dirty="0">
-                <a:solidFill>
-                  <a:srgbClr val="002060"/>
-                </a:solidFill>
-              </a:rPr>
-              <a:t>.</a:t>
-            </a:r>
-          </a:p>
-          <a:p>
-            <a:pPr marL="285750" indent="-285750">
-              <a:buFont typeface="Wingdings" panose="05000000000000000000" pitchFamily="2" charset="2"/>
-              <a:buChar char="Ø"/>
-            </a:pPr>
             <a:endParaRPr lang="en-US" sz="1600" dirty="0">
               <a:solidFill>
                 <a:srgbClr val="002060"/>
@@ -29520,6 +30067,62 @@
           </a:p>
         </p:txBody>
       </p:sp>
+      <p:pic>
+        <p:nvPicPr>
+          <p:cNvPr id="3" name="תמונה 2">
+            <a:extLst>
+              <a:ext uri="{FF2B5EF4-FFF2-40B4-BE49-F238E27FC236}">
+                <a16:creationId xmlns:a16="http://schemas.microsoft.com/office/drawing/2014/main" id="{972ED784-FC8E-0E77-8CD2-7912EE175122}"/>
+              </a:ext>
+            </a:extLst>
+          </p:cNvPr>
+          <p:cNvPicPr>
+            <a:picLocks noChangeAspect="1"/>
+          </p:cNvPicPr>
+          <p:nvPr/>
+        </p:nvPicPr>
+        <p:blipFill>
+          <a:blip r:embed="rId3"/>
+          <a:stretch>
+            <a:fillRect/>
+          </a:stretch>
+        </p:blipFill>
+        <p:spPr>
+          <a:xfrm>
+            <a:off x="869715" y="1967425"/>
+            <a:ext cx="7522763" cy="3060905"/>
+          </a:xfrm>
+          <a:prstGeom prst="roundRect">
+            <a:avLst>
+              <a:gd name="adj" fmla="val 4167"/>
+            </a:avLst>
+          </a:prstGeom>
+          <a:solidFill>
+            <a:srgbClr val="FFFFFF"/>
+          </a:solidFill>
+          <a:ln w="76200" cap="sq">
+            <a:solidFill>
+              <a:srgbClr val="EAEAEA"/>
+            </a:solidFill>
+            <a:miter lim="800000"/>
+          </a:ln>
+          <a:effectLst>
+            <a:reflection blurRad="12700" stA="33000" endPos="28000" dist="5000" dir="5400000" sy="-100000" algn="bl" rotWithShape="0"/>
+          </a:effectLst>
+          <a:scene3d>
+            <a:camera prst="orthographicFront"/>
+            <a:lightRig rig="threePt" dir="t">
+              <a:rot lat="0" lon="0" rev="2700000"/>
+            </a:lightRig>
+          </a:scene3d>
+          <a:sp3d contourW="6350">
+            <a:bevelT h="38100"/>
+            <a:contourClr>
+              <a:srgbClr val="C0C0C0"/>
+            </a:contourClr>
+          </a:sp3d>
+        </p:spPr>
+      </p:pic>
     </p:spTree>
   </p:cSld>
   <p:clrMapOvr>

</xml_diff>